<commit_message>
Updated mortality rates for missing BMI/ASA
</commit_message>
<xml_diff>
--- a/Project2/Reports/Project 2 Final Presentation.pptx
+++ b/Project2/Reports/Project 2 Final Presentation.pptx
@@ -5002,6 +5002,11 @@
           <a:prstGeom prst="line">
             <a:avLst/>
           </a:prstGeom>
+          <a:ln>
+            <a:solidFill>
+              <a:schemeClr val="tx1"/>
+            </a:solidFill>
+          </a:ln>
         </p:spPr>
         <p:style>
           <a:lnRef idx="1">
@@ -5123,21 +5128,28 @@
                 <a:latin typeface="Times New Roman" panose="02020603050405020304" pitchFamily="18" charset="0"/>
                 <a:cs typeface="Times New Roman" panose="02020603050405020304" pitchFamily="18" charset="0"/>
               </a:rPr>
-              <a:t>Missing </a:t>
+              <a:t>Missing covariate data in logistic regressions (missing BMI or </a:t>
             </a:r>
             <a:r>
               <a:rPr lang="en-US" dirty="0" smtClean="0">
                 <a:latin typeface="Times New Roman" panose="02020603050405020304" pitchFamily="18" charset="0"/>
                 <a:cs typeface="Times New Roman" panose="02020603050405020304" pitchFamily="18" charset="0"/>
               </a:rPr>
-              <a:t>covariate data in logistic regressions (missing BMI or ASA) associated with higher mortality </a:t>
+              <a:t>procedure</a:t>
             </a:r>
             <a:r>
               <a:rPr lang="en-US" dirty="0" smtClean="0">
                 <a:latin typeface="Times New Roman" panose="02020603050405020304" pitchFamily="18" charset="0"/>
                 <a:cs typeface="Times New Roman" panose="02020603050405020304" pitchFamily="18" charset="0"/>
               </a:rPr>
-              <a:t>rates</a:t>
+              <a:t>) </a:t>
+            </a:r>
+            <a:r>
+              <a:rPr lang="en-US" dirty="0" smtClean="0">
+                <a:latin typeface="Times New Roman" panose="02020603050405020304" pitchFamily="18" charset="0"/>
+                <a:cs typeface="Times New Roman" panose="02020603050405020304" pitchFamily="18" charset="0"/>
+              </a:rPr>
+              <a:t>associated with higher mortality rates</a:t>
             </a:r>
             <a:endParaRPr lang="en-US" dirty="0">
               <a:latin typeface="Times New Roman" panose="02020603050405020304" pitchFamily="18" charset="0"/>
@@ -5170,6 +5182,16 @@
               </a:rPr>
               <a:t>%</a:t>
             </a:r>
+          </a:p>
+          <a:p>
+            <a:pPr lvl="2"/>
+            <a:r>
+              <a:rPr lang="en-US" dirty="0" smtClean="0">
+                <a:latin typeface="Times New Roman" panose="02020603050405020304" pitchFamily="18" charset="0"/>
+                <a:cs typeface="Times New Roman" panose="02020603050405020304" pitchFamily="18" charset="0"/>
+              </a:rPr>
+              <a:t>8.01% mortality rate for missing BMI, 9.71% mortality rate for missing procedure</a:t>
+            </a:r>
             <a:endParaRPr lang="en-US" dirty="0" smtClean="0">
               <a:latin typeface="Times New Roman" panose="02020603050405020304" pitchFamily="18" charset="0"/>
               <a:cs typeface="Times New Roman" panose="02020603050405020304" pitchFamily="18" charset="0"/>
@@ -5183,10 +5205,6 @@
               </a:rPr>
               <a:t>Missingness associated with outcome = potential bias in analysis</a:t>
             </a:r>
-            <a:endParaRPr lang="en-US" dirty="0" smtClean="0">
-              <a:latin typeface="Times New Roman" panose="02020603050405020304" pitchFamily="18" charset="0"/>
-              <a:cs typeface="Times New Roman" panose="02020603050405020304" pitchFamily="18" charset="0"/>
-            </a:endParaRPr>
           </a:p>
         </p:txBody>
       </p:sp>
@@ -5297,14 +5315,7 @@
                 <a:latin typeface="Times New Roman" panose="02020603050405020304" pitchFamily="18" charset="0"/>
                 <a:cs typeface="Times New Roman" panose="02020603050405020304" pitchFamily="18" charset="0"/>
               </a:rPr>
-              <a:t>logistic regression </a:t>
-            </a:r>
-            <a:r>
-              <a:rPr lang="en-US" dirty="0">
-                <a:latin typeface="Times New Roman" panose="02020603050405020304" pitchFamily="18" charset="0"/>
-                <a:cs typeface="Times New Roman" panose="02020603050405020304" pitchFamily="18" charset="0"/>
-              </a:rPr>
-              <a:t>(</a:t>
+              <a:t>logistic regression (</a:t>
             </a:r>
             <a:r>
               <a:rPr lang="en-US" dirty="0" smtClean="0">
@@ -7689,8 +7700,8 @@
         </p:nvSpPr>
         <p:spPr>
           <a:xfrm>
-            <a:off x="8429626" y="1862138"/>
-            <a:ext cx="3429000" cy="3970318"/>
+            <a:off x="8429626" y="1690688"/>
+            <a:ext cx="3429000" cy="4401205"/>
           </a:xfrm>
           <a:prstGeom prst="rect">
             <a:avLst/>
@@ -7712,8 +7723,21 @@
                 <a:latin typeface="Times New Roman" panose="02020603050405020304" pitchFamily="18" charset="0"/>
                 <a:cs typeface="Times New Roman" panose="02020603050405020304" pitchFamily="18" charset="0"/>
               </a:rPr>
-              <a:t>Estimate magnitude and direction do not change with addition of albumin</a:t>
+              <a:t>Estimate magnitude and direction do not change with addition of </a:t>
             </a:r>
+            <a:r>
+              <a:rPr lang="en-US" sz="2800" dirty="0" smtClean="0">
+                <a:latin typeface="Times New Roman" panose="02020603050405020304" pitchFamily="18" charset="0"/>
+                <a:cs typeface="Times New Roman" panose="02020603050405020304" pitchFamily="18" charset="0"/>
+              </a:rPr>
+              <a:t>albumin</a:t>
+            </a:r>
+          </a:p>
+          <a:p>
+            <a:endParaRPr lang="en-US" sz="2800" dirty="0" smtClean="0">
+              <a:latin typeface="Times New Roman" panose="02020603050405020304" pitchFamily="18" charset="0"/>
+              <a:cs typeface="Times New Roman" panose="02020603050405020304" pitchFamily="18" charset="0"/>
+            </a:endParaRPr>
           </a:p>
           <a:p>
             <a:pPr marL="457200" indent="-457200">
@@ -11980,10 +12004,6 @@
               </a:rPr>
               <a:t>May want to change ratio in future to only visit unique hospitals</a:t>
             </a:r>
-            <a:endParaRPr lang="en-US" dirty="0" smtClean="0">
-              <a:latin typeface="Times New Roman" panose="02020603050405020304" pitchFamily="18" charset="0"/>
-              <a:cs typeface="Times New Roman" panose="02020603050405020304" pitchFamily="18" charset="0"/>
-            </a:endParaRPr>
           </a:p>
           <a:p>
             <a:endParaRPr lang="en-US" dirty="0" smtClean="0">

</xml_diff>